<commit_message>
updated cluster pic for more GPUs
</commit_message>
<xml_diff>
--- a/resources/img.pptx
+++ b/resources/img.pptx
@@ -104,6 +104,11 @@
       </a:defRPr>
     </a:lvl9pPr>
   </p:defaultTextStyle>
+  <p:extLst>
+    <p:ext uri="{EFAFB233-063F-42B5-8137-9DF3F51BA10A}">
+      <p15:sldGuideLst xmlns:p15="http://schemas.microsoft.com/office/powerpoint/2012/main"/>
+    </p:ext>
+  </p:extLst>
 </p:presentation>
 </file>
 
@@ -254,7 +259,7 @@
           <a:p>
             <a:fld id="{8E5EF151-49BD-0946-9F94-C833372E8A6B}" type="datetimeFigureOut">
               <a:rPr lang="en-US" smtClean="0"/>
-              <a:t>4/26/22</a:t>
+              <a:t>6/22/22</a:t>
             </a:fld>
             <a:endParaRPr lang="en-US"/>
           </a:p>
@@ -452,7 +457,7 @@
           <a:p>
             <a:fld id="{8E5EF151-49BD-0946-9F94-C833372E8A6B}" type="datetimeFigureOut">
               <a:rPr lang="en-US" smtClean="0"/>
-              <a:t>4/26/22</a:t>
+              <a:t>6/22/22</a:t>
             </a:fld>
             <a:endParaRPr lang="en-US"/>
           </a:p>
@@ -660,7 +665,7 @@
           <a:p>
             <a:fld id="{8E5EF151-49BD-0946-9F94-C833372E8A6B}" type="datetimeFigureOut">
               <a:rPr lang="en-US" smtClean="0"/>
-              <a:t>4/26/22</a:t>
+              <a:t>6/22/22</a:t>
             </a:fld>
             <a:endParaRPr lang="en-US"/>
           </a:p>
@@ -858,7 +863,7 @@
           <a:p>
             <a:fld id="{8E5EF151-49BD-0946-9F94-C833372E8A6B}" type="datetimeFigureOut">
               <a:rPr lang="en-US" smtClean="0"/>
-              <a:t>4/26/22</a:t>
+              <a:t>6/22/22</a:t>
             </a:fld>
             <a:endParaRPr lang="en-US"/>
           </a:p>
@@ -1133,7 +1138,7 @@
           <a:p>
             <a:fld id="{8E5EF151-49BD-0946-9F94-C833372E8A6B}" type="datetimeFigureOut">
               <a:rPr lang="en-US" smtClean="0"/>
-              <a:t>4/26/22</a:t>
+              <a:t>6/22/22</a:t>
             </a:fld>
             <a:endParaRPr lang="en-US"/>
           </a:p>
@@ -1398,7 +1403,7 @@
           <a:p>
             <a:fld id="{8E5EF151-49BD-0946-9F94-C833372E8A6B}" type="datetimeFigureOut">
               <a:rPr lang="en-US" smtClean="0"/>
-              <a:t>4/26/22</a:t>
+              <a:t>6/22/22</a:t>
             </a:fld>
             <a:endParaRPr lang="en-US"/>
           </a:p>
@@ -1810,7 +1815,7 @@
           <a:p>
             <a:fld id="{8E5EF151-49BD-0946-9F94-C833372E8A6B}" type="datetimeFigureOut">
               <a:rPr lang="en-US" smtClean="0"/>
-              <a:t>4/26/22</a:t>
+              <a:t>6/22/22</a:t>
             </a:fld>
             <a:endParaRPr lang="en-US"/>
           </a:p>
@@ -1951,7 +1956,7 @@
           <a:p>
             <a:fld id="{8E5EF151-49BD-0946-9F94-C833372E8A6B}" type="datetimeFigureOut">
               <a:rPr lang="en-US" smtClean="0"/>
-              <a:t>4/26/22</a:t>
+              <a:t>6/22/22</a:t>
             </a:fld>
             <a:endParaRPr lang="en-US"/>
           </a:p>
@@ -2064,7 +2069,7 @@
           <a:p>
             <a:fld id="{8E5EF151-49BD-0946-9F94-C833372E8A6B}" type="datetimeFigureOut">
               <a:rPr lang="en-US" smtClean="0"/>
-              <a:t>4/26/22</a:t>
+              <a:t>6/22/22</a:t>
             </a:fld>
             <a:endParaRPr lang="en-US"/>
           </a:p>
@@ -2375,7 +2380,7 @@
           <a:p>
             <a:fld id="{8E5EF151-49BD-0946-9F94-C833372E8A6B}" type="datetimeFigureOut">
               <a:rPr lang="en-US" smtClean="0"/>
-              <a:t>4/26/22</a:t>
+              <a:t>6/22/22</a:t>
             </a:fld>
             <a:endParaRPr lang="en-US"/>
           </a:p>
@@ -2663,7 +2668,7 @@
           <a:p>
             <a:fld id="{8E5EF151-49BD-0946-9F94-C833372E8A6B}" type="datetimeFigureOut">
               <a:rPr lang="en-US" smtClean="0"/>
-              <a:t>4/26/22</a:t>
+              <a:t>6/22/22</a:t>
             </a:fld>
             <a:endParaRPr lang="en-US"/>
           </a:p>
@@ -2904,7 +2909,7 @@
           <a:p>
             <a:fld id="{8E5EF151-49BD-0946-9F94-C833372E8A6B}" type="datetimeFigureOut">
               <a:rPr lang="en-US" smtClean="0"/>
-              <a:t>4/26/22</a:t>
+              <a:t>6/22/22</a:t>
             </a:fld>
             <a:endParaRPr lang="en-US"/>
           </a:p>
@@ -3672,7 +3677,7 @@
         </p:nvSpPr>
         <p:spPr>
           <a:xfrm>
-            <a:off x="2223959" y="4229346"/>
+            <a:off x="2102569" y="4076910"/>
             <a:ext cx="2798584" cy="1200329"/>
           </a:xfrm>
           <a:prstGeom prst="rect">
@@ -3694,7 +3699,7 @@
           <a:p>
             <a:r>
               <a:rPr lang="en-US" dirty="0"/>
-              <a:t>64 AMD cores each</a:t>
+              <a:t>64 AMD cores each </a:t>
             </a:r>
           </a:p>
           <a:p>
@@ -3706,7 +3711,7 @@
           <a:p>
             <a:r>
               <a:rPr lang="en-US" dirty="0"/>
-              <a:t>NVIDIA A100 GPU 40GB</a:t>
+              <a:t>2 NVIDIA A100 GPU 40GB</a:t>
             </a:r>
           </a:p>
         </p:txBody>

</xml_diff>